<commit_message>
ajout script map, commentaires plus precis
</commit_message>
<xml_diff>
--- a/Présentation1.pptx
+++ b/Présentation1.pptx
@@ -6,8 +6,7 @@
   </p:sldMasterIdLst>
   <p:sldIdLst>
     <p:sldId id="256" r:id="rId2"/>
-    <p:sldId id="257" r:id="rId3"/>
-    <p:sldId id="258" r:id="rId4"/>
+    <p:sldId id="258" r:id="rId3"/>
   </p:sldIdLst>
   <p:sldSz cx="12192000" cy="6858000"/>
   <p:notesSz cx="6858000" cy="9144000"/>
@@ -261,7 +260,7 @@
           <a:p>
             <a:fld id="{82ECA3A9-C494-482B-B78E-EE7643EF02FA}" type="datetimeFigureOut">
               <a:rPr lang="fr-FR" smtClean="0"/>
-              <a:t>23/06/2021</a:t>
+              <a:t>26/06/2021</a:t>
             </a:fld>
             <a:endParaRPr lang="fr-FR"/>
           </a:p>
@@ -459,7 +458,7 @@
           <a:p>
             <a:fld id="{82ECA3A9-C494-482B-B78E-EE7643EF02FA}" type="datetimeFigureOut">
               <a:rPr lang="fr-FR" smtClean="0"/>
-              <a:t>23/06/2021</a:t>
+              <a:t>26/06/2021</a:t>
             </a:fld>
             <a:endParaRPr lang="fr-FR"/>
           </a:p>
@@ -667,7 +666,7 @@
           <a:p>
             <a:fld id="{82ECA3A9-C494-482B-B78E-EE7643EF02FA}" type="datetimeFigureOut">
               <a:rPr lang="fr-FR" smtClean="0"/>
-              <a:t>23/06/2021</a:t>
+              <a:t>26/06/2021</a:t>
             </a:fld>
             <a:endParaRPr lang="fr-FR"/>
           </a:p>
@@ -865,7 +864,7 @@
           <a:p>
             <a:fld id="{82ECA3A9-C494-482B-B78E-EE7643EF02FA}" type="datetimeFigureOut">
               <a:rPr lang="fr-FR" smtClean="0"/>
-              <a:t>23/06/2021</a:t>
+              <a:t>26/06/2021</a:t>
             </a:fld>
             <a:endParaRPr lang="fr-FR"/>
           </a:p>
@@ -1140,7 +1139,7 @@
           <a:p>
             <a:fld id="{82ECA3A9-C494-482B-B78E-EE7643EF02FA}" type="datetimeFigureOut">
               <a:rPr lang="fr-FR" smtClean="0"/>
-              <a:t>23/06/2021</a:t>
+              <a:t>26/06/2021</a:t>
             </a:fld>
             <a:endParaRPr lang="fr-FR"/>
           </a:p>
@@ -1405,7 +1404,7 @@
           <a:p>
             <a:fld id="{82ECA3A9-C494-482B-B78E-EE7643EF02FA}" type="datetimeFigureOut">
               <a:rPr lang="fr-FR" smtClean="0"/>
-              <a:t>23/06/2021</a:t>
+              <a:t>26/06/2021</a:t>
             </a:fld>
             <a:endParaRPr lang="fr-FR"/>
           </a:p>
@@ -1817,7 +1816,7 @@
           <a:p>
             <a:fld id="{82ECA3A9-C494-482B-B78E-EE7643EF02FA}" type="datetimeFigureOut">
               <a:rPr lang="fr-FR" smtClean="0"/>
-              <a:t>23/06/2021</a:t>
+              <a:t>26/06/2021</a:t>
             </a:fld>
             <a:endParaRPr lang="fr-FR"/>
           </a:p>
@@ -1958,7 +1957,7 @@
           <a:p>
             <a:fld id="{82ECA3A9-C494-482B-B78E-EE7643EF02FA}" type="datetimeFigureOut">
               <a:rPr lang="fr-FR" smtClean="0"/>
-              <a:t>23/06/2021</a:t>
+              <a:t>26/06/2021</a:t>
             </a:fld>
             <a:endParaRPr lang="fr-FR"/>
           </a:p>
@@ -2071,7 +2070,7 @@
           <a:p>
             <a:fld id="{82ECA3A9-C494-482B-B78E-EE7643EF02FA}" type="datetimeFigureOut">
               <a:rPr lang="fr-FR" smtClean="0"/>
-              <a:t>23/06/2021</a:t>
+              <a:t>26/06/2021</a:t>
             </a:fld>
             <a:endParaRPr lang="fr-FR"/>
           </a:p>
@@ -2382,7 +2381,7 @@
           <a:p>
             <a:fld id="{82ECA3A9-C494-482B-B78E-EE7643EF02FA}" type="datetimeFigureOut">
               <a:rPr lang="fr-FR" smtClean="0"/>
-              <a:t>23/06/2021</a:t>
+              <a:t>26/06/2021</a:t>
             </a:fld>
             <a:endParaRPr lang="fr-FR"/>
           </a:p>
@@ -2670,7 +2669,7 @@
           <a:p>
             <a:fld id="{82ECA3A9-C494-482B-B78E-EE7643EF02FA}" type="datetimeFigureOut">
               <a:rPr lang="fr-FR" smtClean="0"/>
-              <a:t>23/06/2021</a:t>
+              <a:t>26/06/2021</a:t>
             </a:fld>
             <a:endParaRPr lang="fr-FR"/>
           </a:p>
@@ -2911,7 +2910,7 @@
           <a:p>
             <a:fld id="{82ECA3A9-C494-482B-B78E-EE7643EF02FA}" type="datetimeFigureOut">
               <a:rPr lang="fr-FR" smtClean="0"/>
-              <a:t>23/06/2021</a:t>
+              <a:t>26/06/2021</a:t>
             </a:fld>
             <a:endParaRPr lang="fr-FR"/>
           </a:p>
@@ -3410,86 +3409,6 @@
       </p:grpSpPr>
       <p:sp>
         <p:nvSpPr>
-          <p:cNvPr id="2" name="Titre 1">
-            <a:extLst>
-              <a:ext uri="{FF2B5EF4-FFF2-40B4-BE49-F238E27FC236}">
-                <a16:creationId xmlns:a16="http://schemas.microsoft.com/office/drawing/2014/main" id="{8296C9B1-8649-4263-B466-5FA45904EACD}"/>
-              </a:ext>
-            </a:extLst>
-          </p:cNvPr>
-          <p:cNvSpPr>
-            <a:spLocks noGrp="1"/>
-          </p:cNvSpPr>
-          <p:nvPr>
-            <p:ph type="title"/>
-          </p:nvPr>
-        </p:nvSpPr>
-        <p:spPr/>
-        <p:txBody>
-          <a:bodyPr/>
-          <a:lstStyle/>
-          <a:p>
-            <a:endParaRPr lang="fr-FR"/>
-          </a:p>
-        </p:txBody>
-      </p:sp>
-      <p:sp>
-        <p:nvSpPr>
-          <p:cNvPr id="3" name="Espace réservé du contenu 2">
-            <a:extLst>
-              <a:ext uri="{FF2B5EF4-FFF2-40B4-BE49-F238E27FC236}">
-                <a16:creationId xmlns:a16="http://schemas.microsoft.com/office/drawing/2014/main" id="{EE49C8FE-CB39-41A1-8842-BFA41E485A8F}"/>
-              </a:ext>
-            </a:extLst>
-          </p:cNvPr>
-          <p:cNvSpPr>
-            <a:spLocks noGrp="1"/>
-          </p:cNvSpPr>
-          <p:nvPr>
-            <p:ph idx="1"/>
-          </p:nvPr>
-        </p:nvSpPr>
-        <p:spPr/>
-        <p:txBody>
-          <a:bodyPr/>
-          <a:lstStyle/>
-          <a:p>
-            <a:endParaRPr lang="fr-FR"/>
-          </a:p>
-        </p:txBody>
-      </p:sp>
-    </p:spTree>
-    <p:extLst>
-      <p:ext uri="{BB962C8B-B14F-4D97-AF65-F5344CB8AC3E}">
-        <p14:creationId xmlns:p14="http://schemas.microsoft.com/office/powerpoint/2010/main" val="3440631977"/>
-      </p:ext>
-    </p:extLst>
-  </p:cSld>
-  <p:clrMapOvr>
-    <a:masterClrMapping/>
-  </p:clrMapOvr>
-</p:sld>
-</file>
-
-<file path=ppt/slides/slide3.xml><?xml version="1.0" encoding="utf-8"?>
-<p:sld xmlns:a="http://schemas.openxmlformats.org/drawingml/2006/main" xmlns:r="http://schemas.openxmlformats.org/officeDocument/2006/relationships" xmlns:p="http://schemas.openxmlformats.org/presentationml/2006/main">
-  <p:cSld>
-    <p:spTree>
-      <p:nvGrpSpPr>
-        <p:cNvPr id="1" name=""/>
-        <p:cNvGrpSpPr/>
-        <p:nvPr/>
-      </p:nvGrpSpPr>
-      <p:grpSpPr>
-        <a:xfrm>
-          <a:off x="0" y="0"/>
-          <a:ext cx="0" cy="0"/>
-          <a:chOff x="0" y="0"/>
-          <a:chExt cx="0" cy="0"/>
-        </a:xfrm>
-      </p:grpSpPr>
-      <p:sp>
-        <p:nvSpPr>
           <p:cNvPr id="4" name="Rectangle : coins arrondis 3">
             <a:extLst>
               <a:ext uri="{FF2B5EF4-FFF2-40B4-BE49-F238E27FC236}">

</xml_diff>